<commit_message>
feat: update for final slides
</commit_message>
<xml_diff>
--- a/NH-Python_Pres/PoliticsAndPerplexityInPython-SentimentAnalysisOnTheCleanWaterRule.pptx
+++ b/NH-Python_Pres/PoliticsAndPerplexityInPython-SentimentAnalysisOnTheCleanWaterRule.pptx
@@ -8634,7 +8634,7 @@
           <a:p>
             <a:fld id="{A906F612-4480-B841-B910-2B9EA0538EA7}" type="datetime1">
               <a:rPr lang="en-US" altLang="zh-TW" smtClean="0"/>
-              <a:t>4/22/20</a:t>
+              <a:t>4/24/20</a:t>
             </a:fld>
             <a:endParaRPr lang="en-US" altLang="zh-TW"/>
           </a:p>
@@ -27724,7 +27724,7 @@
           <a:p>
             <a:r>
               <a:rPr lang="en-US" dirty="0"/>
-              <a:t>Round II Performance Comparison (Accuracy)</a:t>
+              <a:t>Round II Performance Comparison</a:t>
             </a:r>
           </a:p>
         </p:txBody>

</xml_diff>